<commit_message>
Update Machine Learning - PCA.pptx
</commit_message>
<xml_diff>
--- a/Bloque 3 - Machine Learning/02_No supervisado/PCA/Machine Learning - PCA.pptx
+++ b/Bloque 3 - Machine Learning/02_No supervisado/PCA/Machine Learning - PCA.pptx
@@ -9977,7 +9977,221 @@
           <a:lstStyle/>
           <a:p>
             <a:pPr algn="ctr"/>
-            <a:endParaRPr lang="es-ES"/>
+            <a:endParaRPr lang="es-ES" dirty="0"/>
+          </a:p>
+        </p:txBody>
+      </p:sp>
+      <p:sp>
+        <p:nvSpPr>
+          <p:cNvPr id="4" name="CuadroTexto 3">
+            <a:extLst>
+              <a:ext uri="{FF2B5EF4-FFF2-40B4-BE49-F238E27FC236}">
+                <a16:creationId xmlns:a16="http://schemas.microsoft.com/office/drawing/2014/main" id="{039E49F3-8172-4939-A4B5-BA7222E8E245}"/>
+              </a:ext>
+            </a:extLst>
+          </p:cNvPr>
+          <p:cNvSpPr txBox="1"/>
+          <p:nvPr/>
+        </p:nvSpPr>
+        <p:spPr>
+          <a:xfrm>
+            <a:off x="10558855" y="160338"/>
+            <a:ext cx="1379417" cy="369332"/>
+          </a:xfrm>
+          <a:prstGeom prst="rect">
+            <a:avLst/>
+          </a:prstGeom>
+          <a:noFill/>
+          <a:ln w="38100">
+            <a:solidFill>
+              <a:schemeClr val="accent5">
+                <a:lumMod val="50000"/>
+              </a:schemeClr>
+            </a:solidFill>
+          </a:ln>
+        </p:spPr>
+        <p:txBody>
+          <a:bodyPr wrap="none" rtlCol="0">
+            <a:spAutoFit/>
+          </a:bodyPr>
+          <a:lstStyle/>
+          <a:p>
+            <a:r>
+              <a:rPr lang="es-ES" dirty="0"/>
+              <a:t>Var = 100%</a:t>
+            </a:r>
+          </a:p>
+        </p:txBody>
+      </p:sp>
+      <p:sp>
+        <p:nvSpPr>
+          <p:cNvPr id="17" name="CuadroTexto 16">
+            <a:extLst>
+              <a:ext uri="{FF2B5EF4-FFF2-40B4-BE49-F238E27FC236}">
+                <a16:creationId xmlns:a16="http://schemas.microsoft.com/office/drawing/2014/main" id="{5BC8F256-2451-4E4E-93AE-C9B482280606}"/>
+              </a:ext>
+            </a:extLst>
+          </p:cNvPr>
+          <p:cNvSpPr txBox="1"/>
+          <p:nvPr/>
+        </p:nvSpPr>
+        <p:spPr>
+          <a:xfrm>
+            <a:off x="10558855" y="2951510"/>
+            <a:ext cx="1251176" cy="369332"/>
+          </a:xfrm>
+          <a:prstGeom prst="rect">
+            <a:avLst/>
+          </a:prstGeom>
+          <a:noFill/>
+          <a:ln w="38100">
+            <a:solidFill>
+              <a:schemeClr val="accent5">
+                <a:lumMod val="50000"/>
+              </a:schemeClr>
+            </a:solidFill>
+          </a:ln>
+        </p:spPr>
+        <p:txBody>
+          <a:bodyPr wrap="none" rtlCol="0">
+            <a:spAutoFit/>
+          </a:bodyPr>
+          <a:lstStyle/>
+          <a:p>
+            <a:r>
+              <a:rPr lang="es-ES" dirty="0"/>
+              <a:t>Var = 95%</a:t>
+            </a:r>
+          </a:p>
+        </p:txBody>
+      </p:sp>
+      <p:sp>
+        <p:nvSpPr>
+          <p:cNvPr id="8" name="Flecha: doblada 7">
+            <a:extLst>
+              <a:ext uri="{FF2B5EF4-FFF2-40B4-BE49-F238E27FC236}">
+                <a16:creationId xmlns:a16="http://schemas.microsoft.com/office/drawing/2014/main" id="{D0C16840-DE2C-40BA-829D-EA10ED4F5A62}"/>
+              </a:ext>
+            </a:extLst>
+          </p:cNvPr>
+          <p:cNvSpPr/>
+          <p:nvPr/>
+        </p:nvSpPr>
+        <p:spPr>
+          <a:xfrm>
+            <a:off x="10055467" y="216414"/>
+            <a:ext cx="432716" cy="339285"/>
+          </a:xfrm>
+          <a:prstGeom prst="bentArrow">
+            <a:avLst>
+              <a:gd name="adj1" fmla="val 41844"/>
+              <a:gd name="adj2" fmla="val 35963"/>
+              <a:gd name="adj3" fmla="val 45695"/>
+              <a:gd name="adj4" fmla="val 43750"/>
+            </a:avLst>
+          </a:prstGeom>
+          <a:solidFill>
+            <a:srgbClr val="00B0F0"/>
+          </a:solidFill>
+          <a:ln>
+            <a:solidFill>
+              <a:schemeClr val="accent5">
+                <a:lumMod val="50000"/>
+              </a:schemeClr>
+            </a:solidFill>
+          </a:ln>
+        </p:spPr>
+        <p:style>
+          <a:lnRef idx="2">
+            <a:schemeClr val="accent1">
+              <a:shade val="50000"/>
+            </a:schemeClr>
+          </a:lnRef>
+          <a:fillRef idx="1">
+            <a:schemeClr val="accent1"/>
+          </a:fillRef>
+          <a:effectRef idx="0">
+            <a:schemeClr val="accent1"/>
+          </a:effectRef>
+          <a:fontRef idx="minor">
+            <a:schemeClr val="lt1"/>
+          </a:fontRef>
+        </p:style>
+        <p:txBody>
+          <a:bodyPr rtlCol="0" anchor="ctr"/>
+          <a:lstStyle/>
+          <a:p>
+            <a:pPr algn="ctr"/>
+            <a:endParaRPr lang="es-ES">
+              <a:solidFill>
+                <a:schemeClr val="tx1"/>
+              </a:solidFill>
+            </a:endParaRPr>
+          </a:p>
+        </p:txBody>
+      </p:sp>
+      <p:sp>
+        <p:nvSpPr>
+          <p:cNvPr id="18" name="Flecha: doblada 17">
+            <a:extLst>
+              <a:ext uri="{FF2B5EF4-FFF2-40B4-BE49-F238E27FC236}">
+                <a16:creationId xmlns:a16="http://schemas.microsoft.com/office/drawing/2014/main" id="{27C6B1EC-E6F1-40DF-9980-5B592738DD9E}"/>
+              </a:ext>
+            </a:extLst>
+          </p:cNvPr>
+          <p:cNvSpPr/>
+          <p:nvPr/>
+        </p:nvSpPr>
+        <p:spPr>
+          <a:xfrm>
+            <a:off x="10055467" y="3019769"/>
+            <a:ext cx="432716" cy="339285"/>
+          </a:xfrm>
+          <a:prstGeom prst="bentArrow">
+            <a:avLst>
+              <a:gd name="adj1" fmla="val 41844"/>
+              <a:gd name="adj2" fmla="val 35963"/>
+              <a:gd name="adj3" fmla="val 45695"/>
+              <a:gd name="adj4" fmla="val 43750"/>
+            </a:avLst>
+          </a:prstGeom>
+          <a:solidFill>
+            <a:srgbClr val="00B0F0"/>
+          </a:solidFill>
+          <a:ln>
+            <a:solidFill>
+              <a:schemeClr val="accent5">
+                <a:lumMod val="50000"/>
+              </a:schemeClr>
+            </a:solidFill>
+          </a:ln>
+        </p:spPr>
+        <p:style>
+          <a:lnRef idx="2">
+            <a:schemeClr val="accent1">
+              <a:shade val="50000"/>
+            </a:schemeClr>
+          </a:lnRef>
+          <a:fillRef idx="1">
+            <a:schemeClr val="accent1"/>
+          </a:fillRef>
+          <a:effectRef idx="0">
+            <a:schemeClr val="accent1"/>
+          </a:effectRef>
+          <a:fontRef idx="minor">
+            <a:schemeClr val="lt1"/>
+          </a:fontRef>
+        </p:style>
+        <p:txBody>
+          <a:bodyPr rtlCol="0" anchor="ctr"/>
+          <a:lstStyle/>
+          <a:p>
+            <a:pPr algn="ctr"/>
+            <a:endParaRPr lang="es-ES">
+              <a:solidFill>
+                <a:schemeClr val="tx1"/>
+              </a:solidFill>
+            </a:endParaRPr>
           </a:p>
         </p:txBody>
       </p:sp>
@@ -9986,6 +10200,307 @@
   <p:clrMapOvr>
     <a:masterClrMapping/>
   </p:clrMapOvr>
+  <p:timing>
+    <p:tnLst>
+      <p:par>
+        <p:cTn id="1" dur="indefinite" restart="never" nodeType="tmRoot">
+          <p:childTnLst>
+            <p:seq concurrent="1" nextAc="seek">
+              <p:cTn id="2" dur="indefinite" nodeType="mainSeq">
+                <p:childTnLst>
+                  <p:par>
+                    <p:cTn id="3" fill="hold">
+                      <p:stCondLst>
+                        <p:cond delay="indefinite"/>
+                      </p:stCondLst>
+                      <p:childTnLst>
+                        <p:par>
+                          <p:cTn id="4" fill="hold">
+                            <p:stCondLst>
+                              <p:cond delay="0"/>
+                            </p:stCondLst>
+                            <p:childTnLst>
+                              <p:par>
+                                <p:cTn id="5" presetID="22" presetClass="entr" presetSubtype="1" fill="hold" grpId="0" nodeType="clickEffect">
+                                  <p:stCondLst>
+                                    <p:cond delay="0"/>
+                                  </p:stCondLst>
+                                  <p:childTnLst>
+                                    <p:set>
+                                      <p:cBhvr>
+                                        <p:cTn id="6" dur="1" fill="hold">
+                                          <p:stCondLst>
+                                            <p:cond delay="0"/>
+                                          </p:stCondLst>
+                                        </p:cTn>
+                                        <p:tgtEl>
+                                          <p:spTgt spid="6"/>
+                                        </p:tgtEl>
+                                        <p:attrNameLst>
+                                          <p:attrName>style.visibility</p:attrName>
+                                        </p:attrNameLst>
+                                      </p:cBhvr>
+                                      <p:to>
+                                        <p:strVal val="visible"/>
+                                      </p:to>
+                                    </p:set>
+                                    <p:animEffect transition="in" filter="wipe(up)">
+                                      <p:cBhvr>
+                                        <p:cTn id="7" dur="500"/>
+                                        <p:tgtEl>
+                                          <p:spTgt spid="6"/>
+                                        </p:tgtEl>
+                                      </p:cBhvr>
+                                    </p:animEffect>
+                                  </p:childTnLst>
+                                </p:cTn>
+                              </p:par>
+                            </p:childTnLst>
+                          </p:cTn>
+                        </p:par>
+                      </p:childTnLst>
+                    </p:cTn>
+                  </p:par>
+                  <p:par>
+                    <p:cTn id="8" fill="hold">
+                      <p:stCondLst>
+                        <p:cond delay="indefinite"/>
+                      </p:stCondLst>
+                      <p:childTnLst>
+                        <p:par>
+                          <p:cTn id="9" fill="hold">
+                            <p:stCondLst>
+                              <p:cond delay="0"/>
+                            </p:stCondLst>
+                            <p:childTnLst>
+                              <p:par>
+                                <p:cTn id="10" presetID="10" presetClass="entr" presetSubtype="0" fill="hold" nodeType="clickEffect">
+                                  <p:stCondLst>
+                                    <p:cond delay="0"/>
+                                  </p:stCondLst>
+                                  <p:childTnLst>
+                                    <p:set>
+                                      <p:cBhvr>
+                                        <p:cTn id="11" dur="1" fill="hold">
+                                          <p:stCondLst>
+                                            <p:cond delay="0"/>
+                                          </p:stCondLst>
+                                        </p:cTn>
+                                        <p:tgtEl>
+                                          <p:spTgt spid="9"/>
+                                        </p:tgtEl>
+                                        <p:attrNameLst>
+                                          <p:attrName>style.visibility</p:attrName>
+                                        </p:attrNameLst>
+                                      </p:cBhvr>
+                                      <p:to>
+                                        <p:strVal val="visible"/>
+                                      </p:to>
+                                    </p:set>
+                                    <p:animEffect transition="in" filter="fade">
+                                      <p:cBhvr>
+                                        <p:cTn id="12" dur="500"/>
+                                        <p:tgtEl>
+                                          <p:spTgt spid="9"/>
+                                        </p:tgtEl>
+                                      </p:cBhvr>
+                                    </p:animEffect>
+                                  </p:childTnLst>
+                                </p:cTn>
+                              </p:par>
+                            </p:childTnLst>
+                          </p:cTn>
+                        </p:par>
+                      </p:childTnLst>
+                    </p:cTn>
+                  </p:par>
+                  <p:par>
+                    <p:cTn id="13" fill="hold">
+                      <p:stCondLst>
+                        <p:cond delay="indefinite"/>
+                      </p:stCondLst>
+                      <p:childTnLst>
+                        <p:par>
+                          <p:cTn id="14" fill="hold">
+                            <p:stCondLst>
+                              <p:cond delay="0"/>
+                            </p:stCondLst>
+                            <p:childTnLst>
+                              <p:par>
+                                <p:cTn id="15" presetID="10" presetClass="entr" presetSubtype="0" fill="hold" grpId="0" nodeType="clickEffect">
+                                  <p:stCondLst>
+                                    <p:cond delay="0"/>
+                                  </p:stCondLst>
+                                  <p:childTnLst>
+                                    <p:set>
+                                      <p:cBhvr>
+                                        <p:cTn id="16" dur="1" fill="hold">
+                                          <p:stCondLst>
+                                            <p:cond delay="0"/>
+                                          </p:stCondLst>
+                                        </p:cTn>
+                                        <p:tgtEl>
+                                          <p:spTgt spid="3"/>
+                                        </p:tgtEl>
+                                        <p:attrNameLst>
+                                          <p:attrName>style.visibility</p:attrName>
+                                        </p:attrNameLst>
+                                      </p:cBhvr>
+                                      <p:to>
+                                        <p:strVal val="visible"/>
+                                      </p:to>
+                                    </p:set>
+                                    <p:animEffect transition="in" filter="fade">
+                                      <p:cBhvr>
+                                        <p:cTn id="17" dur="500"/>
+                                        <p:tgtEl>
+                                          <p:spTgt spid="3"/>
+                                        </p:tgtEl>
+                                      </p:cBhvr>
+                                    </p:animEffect>
+                                  </p:childTnLst>
+                                </p:cTn>
+                              </p:par>
+                              <p:par>
+                                <p:cTn id="18" presetID="10" presetClass="entr" presetSubtype="0" fill="hold" grpId="0" nodeType="withEffect">
+                                  <p:stCondLst>
+                                    <p:cond delay="0"/>
+                                  </p:stCondLst>
+                                  <p:childTnLst>
+                                    <p:set>
+                                      <p:cBhvr>
+                                        <p:cTn id="19" dur="1" fill="hold">
+                                          <p:stCondLst>
+                                            <p:cond delay="0"/>
+                                          </p:stCondLst>
+                                        </p:cTn>
+                                        <p:tgtEl>
+                                          <p:spTgt spid="11"/>
+                                        </p:tgtEl>
+                                        <p:attrNameLst>
+                                          <p:attrName>style.visibility</p:attrName>
+                                        </p:attrNameLst>
+                                      </p:cBhvr>
+                                      <p:to>
+                                        <p:strVal val="visible"/>
+                                      </p:to>
+                                    </p:set>
+                                    <p:animEffect transition="in" filter="fade">
+                                      <p:cBhvr>
+                                        <p:cTn id="20" dur="500"/>
+                                        <p:tgtEl>
+                                          <p:spTgt spid="11"/>
+                                        </p:tgtEl>
+                                      </p:cBhvr>
+                                    </p:animEffect>
+                                  </p:childTnLst>
+                                </p:cTn>
+                              </p:par>
+                              <p:par>
+                                <p:cTn id="21" presetID="10" presetClass="entr" presetSubtype="0" fill="hold" grpId="0" nodeType="withEffect">
+                                  <p:stCondLst>
+                                    <p:cond delay="0"/>
+                                  </p:stCondLst>
+                                  <p:childTnLst>
+                                    <p:set>
+                                      <p:cBhvr>
+                                        <p:cTn id="22" dur="1" fill="hold">
+                                          <p:stCondLst>
+                                            <p:cond delay="0"/>
+                                          </p:stCondLst>
+                                        </p:cTn>
+                                        <p:tgtEl>
+                                          <p:spTgt spid="15"/>
+                                        </p:tgtEl>
+                                        <p:attrNameLst>
+                                          <p:attrName>style.visibility</p:attrName>
+                                        </p:attrNameLst>
+                                      </p:cBhvr>
+                                      <p:to>
+                                        <p:strVal val="visible"/>
+                                      </p:to>
+                                    </p:set>
+                                    <p:animEffect transition="in" filter="fade">
+                                      <p:cBhvr>
+                                        <p:cTn id="23" dur="500"/>
+                                        <p:tgtEl>
+                                          <p:spTgt spid="15"/>
+                                        </p:tgtEl>
+                                      </p:cBhvr>
+                                    </p:animEffect>
+                                  </p:childTnLst>
+                                </p:cTn>
+                              </p:par>
+                              <p:par>
+                                <p:cTn id="24" presetID="10" presetClass="entr" presetSubtype="0" fill="hold" grpId="0" nodeType="withEffect">
+                                  <p:stCondLst>
+                                    <p:cond delay="0"/>
+                                  </p:stCondLst>
+                                  <p:childTnLst>
+                                    <p:set>
+                                      <p:cBhvr>
+                                        <p:cTn id="25" dur="1" fill="hold">
+                                          <p:stCondLst>
+                                            <p:cond delay="0"/>
+                                          </p:stCondLst>
+                                        </p:cTn>
+                                        <p:tgtEl>
+                                          <p:spTgt spid="16"/>
+                                        </p:tgtEl>
+                                        <p:attrNameLst>
+                                          <p:attrName>style.visibility</p:attrName>
+                                        </p:attrNameLst>
+                                      </p:cBhvr>
+                                      <p:to>
+                                        <p:strVal val="visible"/>
+                                      </p:to>
+                                    </p:set>
+                                    <p:animEffect transition="in" filter="fade">
+                                      <p:cBhvr>
+                                        <p:cTn id="26" dur="500"/>
+                                        <p:tgtEl>
+                                          <p:spTgt spid="16"/>
+                                        </p:tgtEl>
+                                      </p:cBhvr>
+                                    </p:animEffect>
+                                  </p:childTnLst>
+                                </p:cTn>
+                              </p:par>
+                            </p:childTnLst>
+                          </p:cTn>
+                        </p:par>
+                      </p:childTnLst>
+                    </p:cTn>
+                  </p:par>
+                </p:childTnLst>
+              </p:cTn>
+              <p:prevCondLst>
+                <p:cond evt="onPrev" delay="0">
+                  <p:tgtEl>
+                    <p:sldTgt/>
+                  </p:tgtEl>
+                </p:cond>
+              </p:prevCondLst>
+              <p:nextCondLst>
+                <p:cond evt="onNext" delay="0">
+                  <p:tgtEl>
+                    <p:sldTgt/>
+                  </p:tgtEl>
+                </p:cond>
+              </p:nextCondLst>
+            </p:seq>
+          </p:childTnLst>
+        </p:cTn>
+      </p:par>
+    </p:tnLst>
+    <p:bldLst>
+      <p:bldP spid="3" grpId="0"/>
+      <p:bldP spid="11" grpId="0"/>
+      <p:bldP spid="15" grpId="0"/>
+      <p:bldP spid="16" grpId="0"/>
+      <p:bldP spid="6" grpId="0" animBg="1"/>
+    </p:bldLst>
+  </p:timing>
 </p:sld>
 </file>
 
@@ -11309,7 +11824,7 @@
                 <a:latin typeface="Calibri" panose="020F0502020204030204" pitchFamily="34" charset="0"/>
                 <a:cs typeface="Calibri" panose="020F0502020204030204" pitchFamily="34" charset="0"/>
               </a:rPr>
-              <a:t>La utilidad de este método nos sirve para reducir variables, pero… ¿cómo?</a:t>
+              <a:t>La utilidad de este método consiste en reducir variables, pero… ¿cómo?</a:t>
             </a:r>
           </a:p>
           <a:p>
@@ -14641,7 +15156,7 @@
               <a:t>Para conseguir esto, los </a:t>
             </a:r>
             <a:r>
-              <a:rPr lang="es-ES" sz="1700" spc="-1" dirty="0" err="1">
+              <a:rPr lang="es-ES" sz="1700" b="1" spc="-1" dirty="0" err="1">
                 <a:solidFill>
                   <a:schemeClr val="bg1"/>
                 </a:solidFill>
@@ -14658,15 +15173,43 @@
                 <a:latin typeface="Calibri" panose="020F0502020204030204" pitchFamily="34" charset="0"/>
                 <a:cs typeface="Calibri" panose="020F0502020204030204" pitchFamily="34" charset="0"/>
               </a:rPr>
-              <a:t> serán perpendiculares, es decir, su correlación será 0</a:t>
+              <a:t> serán perpendiculares, es decir, su </a:t>
             </a:r>
-            <a:endParaRPr lang="es-ES" sz="1700" b="0" strike="noStrike" spc="-1" dirty="0">
-              <a:solidFill>
-                <a:schemeClr val="bg1"/>
-              </a:solidFill>
-              <a:latin typeface="Calibri" panose="020F0502020204030204" pitchFamily="34" charset="0"/>
-              <a:cs typeface="Calibri" panose="020F0502020204030204" pitchFamily="34" charset="0"/>
-            </a:endParaRPr>
+            <a:r>
+              <a:rPr lang="es-ES" sz="1700" b="1" spc="-1" dirty="0">
+                <a:solidFill>
+                  <a:schemeClr val="bg1"/>
+                </a:solidFill>
+                <a:latin typeface="Calibri" panose="020F0502020204030204" pitchFamily="34" charset="0"/>
+                <a:cs typeface="Calibri" panose="020F0502020204030204" pitchFamily="34" charset="0"/>
+              </a:rPr>
+              <a:t>correlación será 0</a:t>
+            </a:r>
+          </a:p>
+          <a:p>
+            <a:pPr marL="685800" lvl="1" indent="-227880">
+              <a:lnSpc>
+                <a:spcPct val="90000"/>
+              </a:lnSpc>
+              <a:spcBef>
+                <a:spcPts val="1001"/>
+              </a:spcBef>
+              <a:buClr>
+                <a:srgbClr val="FFFFFF"/>
+              </a:buClr>
+              <a:buFont typeface="Arial"/>
+              <a:buChar char="•"/>
+            </a:pPr>
+            <a:r>
+              <a:rPr lang="es-ES" sz="1700" b="0" strike="noStrike" spc="-1" dirty="0">
+                <a:solidFill>
+                  <a:schemeClr val="bg1"/>
+                </a:solidFill>
+                <a:latin typeface="Calibri" panose="020F0502020204030204" pitchFamily="34" charset="0"/>
+                <a:cs typeface="Calibri" panose="020F0502020204030204" pitchFamily="34" charset="0"/>
+              </a:rPr>
+              <a:t>Esto significa que la información contenida en cualquiera de ellos no podrá ser explicada por ningún otro;  mientras que, en el caso original, sí que suele poder explicarse parte del resto. Es precisamente por esta característica por la que podemos utilizar esta técnica.</a:t>
+            </a:r>
           </a:p>
         </p:txBody>
       </p:sp>
@@ -14751,6 +15294,563 @@
           </a:prstGeom>
         </p:spPr>
       </p:pic>
+      <p:grpSp>
+        <p:nvGrpSpPr>
+          <p:cNvPr id="4" name="Grupo 3">
+            <a:extLst>
+              <a:ext uri="{FF2B5EF4-FFF2-40B4-BE49-F238E27FC236}">
+                <a16:creationId xmlns:a16="http://schemas.microsoft.com/office/drawing/2014/main" id="{2C9787EA-9D63-4083-A74D-03C5E22559E1}"/>
+              </a:ext>
+            </a:extLst>
+          </p:cNvPr>
+          <p:cNvGrpSpPr/>
+          <p:nvPr/>
+        </p:nvGrpSpPr>
+        <p:grpSpPr>
+          <a:xfrm>
+            <a:off x="1148137" y="4319324"/>
+            <a:ext cx="4295775" cy="800100"/>
+            <a:chOff x="1148137" y="2924154"/>
+            <a:chExt cx="4295775" cy="800100"/>
+          </a:xfrm>
+        </p:grpSpPr>
+        <p:sp>
+          <p:nvSpPr>
+            <p:cNvPr id="3" name="Rectángulo 2">
+              <a:extLst>
+                <a:ext uri="{FF2B5EF4-FFF2-40B4-BE49-F238E27FC236}">
+                  <a16:creationId xmlns:a16="http://schemas.microsoft.com/office/drawing/2014/main" id="{0EDB60E1-BD10-4A0B-B3AA-3F165010CEDC}"/>
+                </a:ext>
+              </a:extLst>
+            </p:cNvPr>
+            <p:cNvSpPr/>
+            <p:nvPr/>
+          </p:nvSpPr>
+          <p:spPr>
+            <a:xfrm>
+              <a:off x="1148137" y="2924154"/>
+              <a:ext cx="4295775" cy="800100"/>
+            </a:xfrm>
+            <a:prstGeom prst="rect">
+              <a:avLst/>
+            </a:prstGeom>
+            <a:solidFill>
+              <a:schemeClr val="bg1"/>
+            </a:solidFill>
+          </p:spPr>
+          <p:style>
+            <a:lnRef idx="2">
+              <a:schemeClr val="accent1">
+                <a:shade val="50000"/>
+              </a:schemeClr>
+            </a:lnRef>
+            <a:fillRef idx="1">
+              <a:schemeClr val="accent1"/>
+            </a:fillRef>
+            <a:effectRef idx="0">
+              <a:schemeClr val="accent1"/>
+            </a:effectRef>
+            <a:fontRef idx="minor">
+              <a:schemeClr val="lt1"/>
+            </a:fontRef>
+          </p:style>
+          <p:txBody>
+            <a:bodyPr rtlCol="0" anchor="ctr"/>
+            <a:lstStyle/>
+            <a:p>
+              <a:pPr algn="ctr"/>
+              <a:endParaRPr lang="es-ES"/>
+            </a:p>
+          </p:txBody>
+        </p:sp>
+        <mc:AlternateContent xmlns:mc="http://schemas.openxmlformats.org/markup-compatibility/2006">
+          <mc:Choice xmlns:a14="http://schemas.microsoft.com/office/drawing/2010/main" Requires="a14">
+            <p:sp>
+              <p:nvSpPr>
+                <p:cNvPr id="2" name="CuadroTexto 1">
+                  <a:extLst>
+                    <a:ext uri="{FF2B5EF4-FFF2-40B4-BE49-F238E27FC236}">
+                      <a16:creationId xmlns:a16="http://schemas.microsoft.com/office/drawing/2014/main" id="{A1275600-4E10-4FAE-BBC6-04866A636059}"/>
+                    </a:ext>
+                  </a:extLst>
+                </p:cNvPr>
+                <p:cNvSpPr txBox="1"/>
+                <p:nvPr/>
+              </p:nvSpPr>
+              <p:spPr>
+                <a:xfrm>
+                  <a:off x="1371781" y="3071691"/>
+                  <a:ext cx="3919214" cy="519694"/>
+                </a:xfrm>
+                <a:prstGeom prst="rect">
+                  <a:avLst/>
+                </a:prstGeom>
+                <a:solidFill>
+                  <a:schemeClr val="bg1"/>
+                </a:solidFill>
+              </p:spPr>
+              <p:txBody>
+                <a:bodyPr wrap="none" lIns="0" tIns="0" rIns="0" bIns="0" rtlCol="0">
+                  <a:spAutoFit/>
+                </a:bodyPr>
+                <a:lstStyle/>
+                <a:p>
+                  <a:r>
+                    <a:rPr lang="es-ES" sz="2000" dirty="0"/>
+                    <a:t>Coef. Correlación XY = </a:t>
+                  </a:r>
+                  <a14:m>
+                    <m:oMath xmlns:m="http://schemas.openxmlformats.org/officeDocument/2006/math">
+                      <m:f>
+                        <m:fPr>
+                          <m:ctrlPr>
+                            <a:rPr lang="es-ES" sz="2000" i="1" smtClean="0">
+                              <a:latin typeface="Cambria Math" panose="02040503050406030204" pitchFamily="18" charset="0"/>
+                            </a:rPr>
+                          </m:ctrlPr>
+                        </m:fPr>
+                        <m:num>
+                          <m:r>
+                            <a:rPr lang="es-ES" sz="2000" b="0" i="1" smtClean="0">
+                              <a:latin typeface="Cambria Math" panose="02040503050406030204" pitchFamily="18" charset="0"/>
+                            </a:rPr>
+                            <m:t>𝑐𝑜𝑣</m:t>
+                          </m:r>
+                          <m:r>
+                            <a:rPr lang="es-ES" sz="2000" b="0" i="1" smtClean="0">
+                              <a:latin typeface="Cambria Math" panose="02040503050406030204" pitchFamily="18" charset="0"/>
+                            </a:rPr>
+                            <m:t>(</m:t>
+                          </m:r>
+                          <m:r>
+                            <a:rPr lang="es-ES" sz="2000" b="0" i="1" smtClean="0">
+                              <a:latin typeface="Cambria Math" panose="02040503050406030204" pitchFamily="18" charset="0"/>
+                            </a:rPr>
+                            <m:t>𝑥</m:t>
+                          </m:r>
+                          <m:r>
+                            <a:rPr lang="es-ES" sz="2000" b="0" i="1" smtClean="0">
+                              <a:latin typeface="Cambria Math" panose="02040503050406030204" pitchFamily="18" charset="0"/>
+                            </a:rPr>
+                            <m:t>, </m:t>
+                          </m:r>
+                          <m:r>
+                            <a:rPr lang="es-ES" sz="2000" b="0" i="1" smtClean="0">
+                              <a:latin typeface="Cambria Math" panose="02040503050406030204" pitchFamily="18" charset="0"/>
+                            </a:rPr>
+                            <m:t>𝑦</m:t>
+                          </m:r>
+                          <m:r>
+                            <a:rPr lang="es-ES" sz="2000" b="0" i="1" smtClean="0">
+                              <a:latin typeface="Cambria Math" panose="02040503050406030204" pitchFamily="18" charset="0"/>
+                            </a:rPr>
+                            <m:t>)</m:t>
+                          </m:r>
+                        </m:num>
+                        <m:den>
+                          <m:sSub>
+                            <m:sSubPr>
+                              <m:ctrlPr>
+                                <a:rPr lang="es-ES" sz="2000" i="1">
+                                  <a:latin typeface="Cambria Math" panose="02040503050406030204" pitchFamily="18" charset="0"/>
+                                </a:rPr>
+                              </m:ctrlPr>
+                            </m:sSubPr>
+                            <m:e>
+                              <m:r>
+                                <a:rPr lang="es-ES" sz="2000" i="1">
+                                  <a:latin typeface="Cambria Math" panose="02040503050406030204" pitchFamily="18" charset="0"/>
+                                </a:rPr>
+                                <m:t>𝑠</m:t>
+                              </m:r>
+                            </m:e>
+                            <m:sub>
+                              <m:r>
+                                <a:rPr lang="es-ES" sz="2000" i="1">
+                                  <a:latin typeface="Cambria Math" panose="02040503050406030204" pitchFamily="18" charset="0"/>
+                                </a:rPr>
+                                <m:t>𝑥</m:t>
+                              </m:r>
+                            </m:sub>
+                          </m:sSub>
+                          <m:r>
+                            <a:rPr lang="es-ES" sz="2000" b="0" i="1" smtClean="0">
+                              <a:latin typeface="Cambria Math" panose="02040503050406030204" pitchFamily="18" charset="0"/>
+                            </a:rPr>
+                            <m:t> </m:t>
+                          </m:r>
+                          <m:sSub>
+                            <m:sSubPr>
+                              <m:ctrlPr>
+                                <a:rPr lang="es-ES" sz="2000" i="1">
+                                  <a:latin typeface="Cambria Math" panose="02040503050406030204" pitchFamily="18" charset="0"/>
+                                </a:rPr>
+                              </m:ctrlPr>
+                            </m:sSubPr>
+                            <m:e>
+                              <m:r>
+                                <a:rPr lang="es-ES" sz="2000" i="1">
+                                  <a:latin typeface="Cambria Math" panose="02040503050406030204" pitchFamily="18" charset="0"/>
+                                </a:rPr>
+                                <m:t>𝑠</m:t>
+                              </m:r>
+                            </m:e>
+                            <m:sub>
+                              <m:r>
+                                <a:rPr lang="es-ES" sz="2000" b="0" i="1" smtClean="0">
+                                  <a:latin typeface="Cambria Math" panose="02040503050406030204" pitchFamily="18" charset="0"/>
+                                </a:rPr>
+                                <m:t>𝑦</m:t>
+                              </m:r>
+                            </m:sub>
+                          </m:sSub>
+                        </m:den>
+                      </m:f>
+                      <m:r>
+                        <a:rPr lang="es-ES" sz="2000" i="1">
+                          <a:latin typeface="Cambria Math" panose="02040503050406030204" pitchFamily="18" charset="0"/>
+                          <a:ea typeface="Cambria Math" panose="02040503050406030204" pitchFamily="18" charset="0"/>
+                        </a:rPr>
+                        <m:t>≠</m:t>
+                      </m:r>
+                      <m:r>
+                        <a:rPr lang="es-ES" sz="2000" b="0" i="1" smtClean="0">
+                          <a:latin typeface="Cambria Math" panose="02040503050406030204" pitchFamily="18" charset="0"/>
+                          <a:ea typeface="Cambria Math" panose="02040503050406030204" pitchFamily="18" charset="0"/>
+                        </a:rPr>
+                        <m:t>0</m:t>
+                      </m:r>
+                    </m:oMath>
+                  </a14:m>
+                  <a:endParaRPr lang="es-ES" sz="2000" dirty="0"/>
+                </a:p>
+              </p:txBody>
+            </p:sp>
+          </mc:Choice>
+          <mc:Fallback>
+            <p:sp>
+              <p:nvSpPr>
+                <p:cNvPr id="2" name="CuadroTexto 1">
+                  <a:extLst>
+                    <a:ext uri="{FF2B5EF4-FFF2-40B4-BE49-F238E27FC236}">
+                      <a16:creationId xmlns:a16="http://schemas.microsoft.com/office/drawing/2014/main" id="{A1275600-4E10-4FAE-BBC6-04866A636059}"/>
+                    </a:ext>
+                  </a:extLst>
+                </p:cNvPr>
+                <p:cNvSpPr txBox="1">
+                  <a:spLocks noRot="1" noChangeAspect="1" noMove="1" noResize="1" noEditPoints="1" noAdjustHandles="1" noChangeArrowheads="1" noChangeShapeType="1" noTextEdit="1"/>
+                </p:cNvSpPr>
+                <p:nvPr/>
+              </p:nvSpPr>
+              <p:spPr>
+                <a:xfrm>
+                  <a:off x="1371781" y="3071691"/>
+                  <a:ext cx="3919214" cy="519694"/>
+                </a:xfrm>
+                <a:prstGeom prst="rect">
+                  <a:avLst/>
+                </a:prstGeom>
+                <a:blipFill>
+                  <a:blip r:embed="rId4"/>
+                  <a:stretch>
+                    <a:fillRect l="-3888" t="-1176" b="-2353"/>
+                  </a:stretch>
+                </a:blipFill>
+              </p:spPr>
+              <p:txBody>
+                <a:bodyPr/>
+                <a:lstStyle/>
+                <a:p>
+                  <a:r>
+                    <a:rPr lang="es-ES">
+                      <a:noFill/>
+                    </a:rPr>
+                    <a:t> </a:t>
+                  </a:r>
+                </a:p>
+              </p:txBody>
+            </p:sp>
+          </mc:Fallback>
+        </mc:AlternateContent>
+      </p:grpSp>
+      <p:grpSp>
+        <p:nvGrpSpPr>
+          <p:cNvPr id="7" name="Grupo 6">
+            <a:extLst>
+              <a:ext uri="{FF2B5EF4-FFF2-40B4-BE49-F238E27FC236}">
+                <a16:creationId xmlns:a16="http://schemas.microsoft.com/office/drawing/2014/main" id="{05D2B224-4B0F-4A21-88E3-D6829E7DFDFB}"/>
+              </a:ext>
+            </a:extLst>
+          </p:cNvPr>
+          <p:cNvGrpSpPr/>
+          <p:nvPr/>
+        </p:nvGrpSpPr>
+        <p:grpSpPr>
+          <a:xfrm>
+            <a:off x="1148137" y="5393304"/>
+            <a:ext cx="4295775" cy="800100"/>
+            <a:chOff x="1148137" y="3998134"/>
+            <a:chExt cx="4295775" cy="800100"/>
+          </a:xfrm>
+        </p:grpSpPr>
+        <p:sp>
+          <p:nvSpPr>
+            <p:cNvPr id="11" name="Rectángulo 10">
+              <a:extLst>
+                <a:ext uri="{FF2B5EF4-FFF2-40B4-BE49-F238E27FC236}">
+                  <a16:creationId xmlns:a16="http://schemas.microsoft.com/office/drawing/2014/main" id="{947AF91D-9456-46B1-8389-8B3608D3456C}"/>
+                </a:ext>
+              </a:extLst>
+            </p:cNvPr>
+            <p:cNvSpPr/>
+            <p:nvPr/>
+          </p:nvSpPr>
+          <p:spPr>
+            <a:xfrm>
+              <a:off x="1148137" y="3998134"/>
+              <a:ext cx="4295775" cy="800100"/>
+            </a:xfrm>
+            <a:prstGeom prst="rect">
+              <a:avLst/>
+            </a:prstGeom>
+            <a:solidFill>
+              <a:schemeClr val="bg1"/>
+            </a:solidFill>
+          </p:spPr>
+          <p:style>
+            <a:lnRef idx="2">
+              <a:schemeClr val="accent1">
+                <a:shade val="50000"/>
+              </a:schemeClr>
+            </a:lnRef>
+            <a:fillRef idx="1">
+              <a:schemeClr val="accent1"/>
+            </a:fillRef>
+            <a:effectRef idx="0">
+              <a:schemeClr val="accent1"/>
+            </a:effectRef>
+            <a:fontRef idx="minor">
+              <a:schemeClr val="lt1"/>
+            </a:fontRef>
+          </p:style>
+          <p:txBody>
+            <a:bodyPr rtlCol="0" anchor="ctr"/>
+            <a:lstStyle/>
+            <a:p>
+              <a:pPr algn="ctr"/>
+              <a:endParaRPr lang="es-ES"/>
+            </a:p>
+          </p:txBody>
+        </p:sp>
+        <mc:AlternateContent xmlns:mc="http://schemas.openxmlformats.org/markup-compatibility/2006">
+          <mc:Choice xmlns:a14="http://schemas.microsoft.com/office/drawing/2010/main" Requires="a14">
+            <p:sp>
+              <p:nvSpPr>
+                <p:cNvPr id="9" name="CuadroTexto 8">
+                  <a:extLst>
+                    <a:ext uri="{FF2B5EF4-FFF2-40B4-BE49-F238E27FC236}">
+                      <a16:creationId xmlns:a16="http://schemas.microsoft.com/office/drawing/2014/main" id="{9162D591-9D7E-439E-85E9-14322E361B5C}"/>
+                    </a:ext>
+                  </a:extLst>
+                </p:cNvPr>
+                <p:cNvSpPr txBox="1"/>
+                <p:nvPr/>
+              </p:nvSpPr>
+              <p:spPr>
+                <a:xfrm>
+                  <a:off x="1371781" y="4153822"/>
+                  <a:ext cx="3935052" cy="488724"/>
+                </a:xfrm>
+                <a:prstGeom prst="rect">
+                  <a:avLst/>
+                </a:prstGeom>
+                <a:solidFill>
+                  <a:schemeClr val="bg1"/>
+                </a:solidFill>
+              </p:spPr>
+              <p:txBody>
+                <a:bodyPr wrap="none" lIns="0" tIns="0" rIns="0" bIns="0" rtlCol="0">
+                  <a:spAutoFit/>
+                </a:bodyPr>
+                <a:lstStyle/>
+                <a:p>
+                  <a:r>
+                    <a:rPr lang="es-ES" sz="2000" dirty="0"/>
+                    <a:t>Coef. Correlación UV = </a:t>
+                  </a:r>
+                  <a14:m>
+                    <m:oMath xmlns:m="http://schemas.openxmlformats.org/officeDocument/2006/math">
+                      <m:f>
+                        <m:fPr>
+                          <m:ctrlPr>
+                            <a:rPr lang="es-ES" sz="2000" i="1" smtClean="0">
+                              <a:latin typeface="Cambria Math" panose="02040503050406030204" pitchFamily="18" charset="0"/>
+                            </a:rPr>
+                          </m:ctrlPr>
+                        </m:fPr>
+                        <m:num>
+                          <m:r>
+                            <a:rPr lang="es-ES" sz="2000" b="0" i="1" smtClean="0">
+                              <a:latin typeface="Cambria Math" panose="02040503050406030204" pitchFamily="18" charset="0"/>
+                            </a:rPr>
+                            <m:t>𝑐𝑜𝑣</m:t>
+                          </m:r>
+                          <m:r>
+                            <a:rPr lang="es-ES" sz="2000" b="0" i="1" smtClean="0">
+                              <a:latin typeface="Cambria Math" panose="02040503050406030204" pitchFamily="18" charset="0"/>
+                            </a:rPr>
+                            <m:t>(</m:t>
+                          </m:r>
+                          <m:r>
+                            <a:rPr lang="es-ES" sz="2000" b="0" i="1" smtClean="0">
+                              <a:latin typeface="Cambria Math" panose="02040503050406030204" pitchFamily="18" charset="0"/>
+                            </a:rPr>
+                            <m:t>𝑢</m:t>
+                          </m:r>
+                          <m:r>
+                            <a:rPr lang="es-ES" sz="2000" b="0" i="1" smtClean="0">
+                              <a:latin typeface="Cambria Math" panose="02040503050406030204" pitchFamily="18" charset="0"/>
+                            </a:rPr>
+                            <m:t>, </m:t>
+                          </m:r>
+                          <m:r>
+                            <a:rPr lang="es-ES" sz="2000" b="0" i="1" smtClean="0">
+                              <a:latin typeface="Cambria Math" panose="02040503050406030204" pitchFamily="18" charset="0"/>
+                            </a:rPr>
+                            <m:t>𝑣</m:t>
+                          </m:r>
+                          <m:r>
+                            <a:rPr lang="es-ES" sz="2000" b="0" i="1" smtClean="0">
+                              <a:latin typeface="Cambria Math" panose="02040503050406030204" pitchFamily="18" charset="0"/>
+                            </a:rPr>
+                            <m:t>)</m:t>
+                          </m:r>
+                        </m:num>
+                        <m:den>
+                          <m:sSub>
+                            <m:sSubPr>
+                              <m:ctrlPr>
+                                <a:rPr lang="es-ES" sz="2000" i="1">
+                                  <a:latin typeface="Cambria Math" panose="02040503050406030204" pitchFamily="18" charset="0"/>
+                                </a:rPr>
+                              </m:ctrlPr>
+                            </m:sSubPr>
+                            <m:e>
+                              <m:r>
+                                <a:rPr lang="es-ES" sz="2000" i="1">
+                                  <a:latin typeface="Cambria Math" panose="02040503050406030204" pitchFamily="18" charset="0"/>
+                                </a:rPr>
+                                <m:t>𝑠</m:t>
+                              </m:r>
+                            </m:e>
+                            <m:sub>
+                              <m:r>
+                                <a:rPr lang="es-ES" sz="2000" b="0" i="1" smtClean="0">
+                                  <a:latin typeface="Cambria Math" panose="02040503050406030204" pitchFamily="18" charset="0"/>
+                                </a:rPr>
+                                <m:t>𝑢</m:t>
+                              </m:r>
+                            </m:sub>
+                          </m:sSub>
+                          <m:r>
+                            <a:rPr lang="es-ES" sz="2000" b="0" i="1" smtClean="0">
+                              <a:latin typeface="Cambria Math" panose="02040503050406030204" pitchFamily="18" charset="0"/>
+                            </a:rPr>
+                            <m:t> </m:t>
+                          </m:r>
+                          <m:sSub>
+                            <m:sSubPr>
+                              <m:ctrlPr>
+                                <a:rPr lang="es-ES" sz="2000" i="1">
+                                  <a:latin typeface="Cambria Math" panose="02040503050406030204" pitchFamily="18" charset="0"/>
+                                </a:rPr>
+                              </m:ctrlPr>
+                            </m:sSubPr>
+                            <m:e>
+                              <m:r>
+                                <a:rPr lang="es-ES" sz="2000" i="1">
+                                  <a:latin typeface="Cambria Math" panose="02040503050406030204" pitchFamily="18" charset="0"/>
+                                </a:rPr>
+                                <m:t>𝑠</m:t>
+                              </m:r>
+                            </m:e>
+                            <m:sub>
+                              <m:r>
+                                <a:rPr lang="es-ES" sz="2000" b="0" i="1" smtClean="0">
+                                  <a:latin typeface="Cambria Math" panose="02040503050406030204" pitchFamily="18" charset="0"/>
+                                </a:rPr>
+                                <m:t>𝑣</m:t>
+                              </m:r>
+                            </m:sub>
+                          </m:sSub>
+                        </m:den>
+                      </m:f>
+                      <m:r>
+                        <a:rPr lang="es-ES" sz="2000" b="0" i="1" smtClean="0">
+                          <a:latin typeface="Cambria Math" panose="02040503050406030204" pitchFamily="18" charset="0"/>
+                        </a:rPr>
+                        <m:t>=</m:t>
+                      </m:r>
+                      <m:r>
+                        <a:rPr lang="es-ES" sz="2000" b="0" i="1" smtClean="0">
+                          <a:latin typeface="Cambria Math" panose="02040503050406030204" pitchFamily="18" charset="0"/>
+                          <a:ea typeface="Cambria Math" panose="02040503050406030204" pitchFamily="18" charset="0"/>
+                        </a:rPr>
+                        <m:t>0</m:t>
+                      </m:r>
+                    </m:oMath>
+                  </a14:m>
+                  <a:endParaRPr lang="es-ES" sz="2000" dirty="0"/>
+                </a:p>
+              </p:txBody>
+            </p:sp>
+          </mc:Choice>
+          <mc:Fallback>
+            <p:sp>
+              <p:nvSpPr>
+                <p:cNvPr id="9" name="CuadroTexto 8">
+                  <a:extLst>
+                    <a:ext uri="{FF2B5EF4-FFF2-40B4-BE49-F238E27FC236}">
+                      <a16:creationId xmlns:a16="http://schemas.microsoft.com/office/drawing/2014/main" id="{9162D591-9D7E-439E-85E9-14322E361B5C}"/>
+                    </a:ext>
+                  </a:extLst>
+                </p:cNvPr>
+                <p:cNvSpPr txBox="1">
+                  <a:spLocks noRot="1" noChangeAspect="1" noMove="1" noResize="1" noEditPoints="1" noAdjustHandles="1" noChangeArrowheads="1" noChangeShapeType="1" noTextEdit="1"/>
+                </p:cNvSpPr>
+                <p:nvPr/>
+              </p:nvSpPr>
+              <p:spPr>
+                <a:xfrm>
+                  <a:off x="1371781" y="4153822"/>
+                  <a:ext cx="3935052" cy="488724"/>
+                </a:xfrm>
+                <a:prstGeom prst="rect">
+                  <a:avLst/>
+                </a:prstGeom>
+                <a:blipFill>
+                  <a:blip r:embed="rId5"/>
+                  <a:stretch>
+                    <a:fillRect l="-3870" t="-1250" b="-10000"/>
+                  </a:stretch>
+                </a:blipFill>
+              </p:spPr>
+              <p:txBody>
+                <a:bodyPr/>
+                <a:lstStyle/>
+                <a:p>
+                  <a:r>
+                    <a:rPr lang="es-ES">
+                      <a:noFill/>
+                    </a:rPr>
+                    <a:t> </a:t>
+                  </a:r>
+                </a:p>
+              </p:txBody>
+            </p:sp>
+          </mc:Fallback>
+        </mc:AlternateContent>
+      </p:grpSp>
     </p:spTree>
     <p:extLst>
       <p:ext uri="{BB962C8B-B14F-4D97-AF65-F5344CB8AC3E}">

</xml_diff>